<commit_message>
Removed authentication for get all users
</commit_message>
<xml_diff>
--- a/project0_presentation.pptx
+++ b/project0_presentation.pptx
@@ -19,7 +19,6 @@
     <p:sldId id="268" r:id="rId13"/>
     <p:sldId id="270" r:id="rId14"/>
     <p:sldId id="271" r:id="rId15"/>
-    <p:sldId id="272" r:id="rId16"/>
   </p:sldIdLst>
   <p:sldSz cx="12192000" cy="6858000"/>
   <p:notesSz cx="6858000" cy="9144000"/>
@@ -118,6 +117,11 @@
       </a:defRPr>
     </a:lvl9pPr>
   </p:defaultTextStyle>
+  <p:extLst>
+    <p:ext uri="{EFAFB233-063F-42B5-8137-9DF3F51BA10A}">
+      <p15:sldGuideLst xmlns:p15="http://schemas.microsoft.com/office/powerpoint/2012/main"/>
+    </p:ext>
+  </p:extLst>
 </p:presentation>
 </file>
 
@@ -260,7 +264,7 @@
           <a:p>
             <a:fld id="{C23A5113-820D-4D08-8D9D-3BBBD15B2BDA}" type="datetimeFigureOut">
               <a:rPr lang="en-US" smtClean="0"/>
-              <a:t>4/15/2019</a:t>
+              <a:t>4/16/2019</a:t>
             </a:fld>
             <a:endParaRPr lang="en-US"/>
           </a:p>
@@ -471,7 +475,7 @@
           <a:p>
             <a:fld id="{C23A5113-820D-4D08-8D9D-3BBBD15B2BDA}" type="datetimeFigureOut">
               <a:rPr lang="en-US" smtClean="0"/>
-              <a:t>4/15/2019</a:t>
+              <a:t>4/16/2019</a:t>
             </a:fld>
             <a:endParaRPr lang="en-US"/>
           </a:p>
@@ -686,7 +690,7 @@
           <a:p>
             <a:fld id="{C23A5113-820D-4D08-8D9D-3BBBD15B2BDA}" type="datetimeFigureOut">
               <a:rPr lang="en-US" smtClean="0"/>
-              <a:t>4/15/2019</a:t>
+              <a:t>4/16/2019</a:t>
             </a:fld>
             <a:endParaRPr lang="en-US"/>
           </a:p>
@@ -1989,7 +1993,7 @@
           <a:p>
             <a:fld id="{C23A5113-820D-4D08-8D9D-3BBBD15B2BDA}" type="datetimeFigureOut">
               <a:rPr lang="en-US" smtClean="0"/>
-              <a:t>4/15/2019</a:t>
+              <a:t>4/16/2019</a:t>
             </a:fld>
             <a:endParaRPr lang="en-US"/>
           </a:p>
@@ -2227,7 +2231,7 @@
           <a:p>
             <a:fld id="{C23A5113-820D-4D08-8D9D-3BBBD15B2BDA}" type="datetimeFigureOut">
               <a:rPr lang="en-US" smtClean="0"/>
-              <a:t>4/15/2019</a:t>
+              <a:t>4/16/2019</a:t>
             </a:fld>
             <a:endParaRPr lang="en-US"/>
           </a:p>
@@ -2503,7 +2507,7 @@
           <a:p>
             <a:fld id="{C23A5113-820D-4D08-8D9D-3BBBD15B2BDA}" type="datetimeFigureOut">
               <a:rPr lang="en-US" smtClean="0"/>
-              <a:t>4/15/2019</a:t>
+              <a:t>4/16/2019</a:t>
             </a:fld>
             <a:endParaRPr lang="en-US"/>
           </a:p>
@@ -3704,7 +3708,7 @@
           <a:p>
             <a:fld id="{C23A5113-820D-4D08-8D9D-3BBBD15B2BDA}" type="datetimeFigureOut">
               <a:rPr lang="en-US" smtClean="0"/>
-              <a:t>4/15/2019</a:t>
+              <a:t>4/16/2019</a:t>
             </a:fld>
             <a:endParaRPr lang="en-US"/>
           </a:p>
@@ -4094,7 +4098,7 @@
           <a:p>
             <a:fld id="{C23A5113-820D-4D08-8D9D-3BBBD15B2BDA}" type="datetimeFigureOut">
               <a:rPr lang="en-US" smtClean="0"/>
-              <a:t>4/15/2019</a:t>
+              <a:t>4/16/2019</a:t>
             </a:fld>
             <a:endParaRPr lang="en-US"/>
           </a:p>
@@ -4217,7 +4221,7 @@
           <a:p>
             <a:fld id="{C23A5113-820D-4D08-8D9D-3BBBD15B2BDA}" type="datetimeFigureOut">
               <a:rPr lang="en-US" smtClean="0"/>
-              <a:t>4/15/2019</a:t>
+              <a:t>4/16/2019</a:t>
             </a:fld>
             <a:endParaRPr lang="en-US"/>
           </a:p>
@@ -4312,7 +4316,7 @@
           <a:p>
             <a:fld id="{C23A5113-820D-4D08-8D9D-3BBBD15B2BDA}" type="datetimeFigureOut">
               <a:rPr lang="en-US" smtClean="0"/>
-              <a:t>4/15/2019</a:t>
+              <a:t>4/16/2019</a:t>
             </a:fld>
             <a:endParaRPr lang="en-US"/>
           </a:p>
@@ -5075,7 +5079,7 @@
           <a:p>
             <a:fld id="{C23A5113-820D-4D08-8D9D-3BBBD15B2BDA}" type="datetimeFigureOut">
               <a:rPr lang="en-US" smtClean="0"/>
-              <a:t>4/15/2019</a:t>
+              <a:t>4/16/2019</a:t>
             </a:fld>
             <a:endParaRPr lang="en-US"/>
           </a:p>
@@ -5304,7 +5308,7 @@
           <a:p>
             <a:fld id="{C23A5113-820D-4D08-8D9D-3BBBD15B2BDA}" type="datetimeFigureOut">
               <a:rPr lang="en-US" smtClean="0"/>
-              <a:t>4/15/2019</a:t>
+              <a:t>4/16/2019</a:t>
             </a:fld>
             <a:endParaRPr lang="en-US"/>
           </a:p>
@@ -6116,7 +6120,7 @@
           <a:p>
             <a:fld id="{C23A5113-820D-4D08-8D9D-3BBBD15B2BDA}" type="datetimeFigureOut">
               <a:rPr lang="en-US" smtClean="0"/>
-              <a:t>4/15/2019</a:t>
+              <a:t>4/16/2019</a:t>
             </a:fld>
             <a:endParaRPr lang="en-US"/>
           </a:p>
@@ -6296,7 +6300,7 @@
           <a:p>
             <a:fld id="{C23A5113-820D-4D08-8D9D-3BBBD15B2BDA}" type="datetimeFigureOut">
               <a:rPr lang="en-US" smtClean="0"/>
-              <a:t>4/15/2019</a:t>
+              <a:t>4/16/2019</a:t>
             </a:fld>
             <a:endParaRPr lang="en-US"/>
           </a:p>
@@ -6476,7 +6480,7 @@
           <a:p>
             <a:fld id="{C23A5113-820D-4D08-8D9D-3BBBD15B2BDA}" type="datetimeFigureOut">
               <a:rPr lang="en-US" smtClean="0"/>
-              <a:t>4/15/2019</a:t>
+              <a:t>4/16/2019</a:t>
             </a:fld>
             <a:endParaRPr lang="en-US"/>
           </a:p>
@@ -6724,7 +6728,7 @@
           <a:p>
             <a:fld id="{C23A5113-820D-4D08-8D9D-3BBBD15B2BDA}" type="datetimeFigureOut">
               <a:rPr lang="en-US" smtClean="0"/>
-              <a:t>4/15/2019</a:t>
+              <a:t>4/16/2019</a:t>
             </a:fld>
             <a:endParaRPr lang="en-US"/>
           </a:p>
@@ -6992,7 +6996,7 @@
           <a:p>
             <a:fld id="{C23A5113-820D-4D08-8D9D-3BBBD15B2BDA}" type="datetimeFigureOut">
               <a:rPr lang="en-US" smtClean="0"/>
-              <a:t>4/15/2019</a:t>
+              <a:t>4/16/2019</a:t>
             </a:fld>
             <a:endParaRPr lang="en-US"/>
           </a:p>
@@ -7408,7 +7412,7 @@
           <a:p>
             <a:fld id="{C23A5113-820D-4D08-8D9D-3BBBD15B2BDA}" type="datetimeFigureOut">
               <a:rPr lang="en-US" smtClean="0"/>
-              <a:t>4/15/2019</a:t>
+              <a:t>4/16/2019</a:t>
             </a:fld>
             <a:endParaRPr lang="en-US"/>
           </a:p>
@@ -7557,7 +7561,7 @@
           <a:p>
             <a:fld id="{C23A5113-820D-4D08-8D9D-3BBBD15B2BDA}" type="datetimeFigureOut">
               <a:rPr lang="en-US" smtClean="0"/>
-              <a:t>4/15/2019</a:t>
+              <a:t>4/16/2019</a:t>
             </a:fld>
             <a:endParaRPr lang="en-US"/>
           </a:p>
@@ -7683,7 +7687,7 @@
           <a:p>
             <a:fld id="{C23A5113-820D-4D08-8D9D-3BBBD15B2BDA}" type="datetimeFigureOut">
               <a:rPr lang="en-US" smtClean="0"/>
-              <a:t>4/15/2019</a:t>
+              <a:t>4/16/2019</a:t>
             </a:fld>
             <a:endParaRPr lang="en-US"/>
           </a:p>
@@ -7934,7 +7938,7 @@
           <a:p>
             <a:fld id="{C23A5113-820D-4D08-8D9D-3BBBD15B2BDA}" type="datetimeFigureOut">
               <a:rPr lang="en-US" smtClean="0"/>
-              <a:t>4/15/2019</a:t>
+              <a:t>4/16/2019</a:t>
             </a:fld>
             <a:endParaRPr lang="en-US"/>
           </a:p>
@@ -8379,7 +8383,7 @@
           <a:p>
             <a:fld id="{C23A5113-820D-4D08-8D9D-3BBBD15B2BDA}" type="datetimeFigureOut">
               <a:rPr lang="en-US" smtClean="0"/>
-              <a:t>4/15/2019</a:t>
+              <a:t>4/16/2019</a:t>
             </a:fld>
             <a:endParaRPr lang="en-US"/>
           </a:p>
@@ -8706,7 +8710,7 @@
           <a:p>
             <a:fld id="{C23A5113-820D-4D08-8D9D-3BBBD15B2BDA}" type="datetimeFigureOut">
               <a:rPr lang="en-US" smtClean="0"/>
-              <a:t>4/15/2019</a:t>
+              <a:t>4/16/2019</a:t>
             </a:fld>
             <a:endParaRPr lang="en-US"/>
           </a:p>
@@ -9331,7 +9335,7 @@
           <a:p>
             <a:fld id="{C23A5113-820D-4D08-8D9D-3BBBD15B2BDA}" type="datetimeFigureOut">
               <a:rPr lang="en-US" smtClean="0"/>
-              <a:t>4/15/2019</a:t>
+              <a:t>4/16/2019</a:t>
             </a:fld>
             <a:endParaRPr lang="en-US"/>
           </a:p>
@@ -10689,73 +10693,6 @@
     <p:extLst>
       <p:ext uri="{BB962C8B-B14F-4D97-AF65-F5344CB8AC3E}">
         <p14:creationId xmlns:p14="http://schemas.microsoft.com/office/powerpoint/2010/main" val="4051292904"/>
-      </p:ext>
-    </p:extLst>
-  </p:cSld>
-  <p:clrMapOvr>
-    <a:masterClrMapping/>
-  </p:clrMapOvr>
-</p:sld>
-</file>
-
-<file path=ppt/slides/slide14.xml><?xml version="1.0" encoding="utf-8"?>
-<p:sld xmlns:a="http://schemas.openxmlformats.org/drawingml/2006/main" xmlns:r="http://schemas.openxmlformats.org/officeDocument/2006/relationships" xmlns:p="http://schemas.openxmlformats.org/presentationml/2006/main">
-  <p:cSld>
-    <p:spTree>
-      <p:nvGrpSpPr>
-        <p:cNvPr id="1" name=""/>
-        <p:cNvGrpSpPr/>
-        <p:nvPr/>
-      </p:nvGrpSpPr>
-      <p:grpSpPr>
-        <a:xfrm>
-          <a:off x="0" y="0"/>
-          <a:ext cx="0" cy="0"/>
-          <a:chOff x="0" y="0"/>
-          <a:chExt cx="0" cy="0"/>
-        </a:xfrm>
-      </p:grpSpPr>
-      <p:sp>
-        <p:nvSpPr>
-          <p:cNvPr id="2" name="Title 1">
-            <a:extLst>
-              <a:ext uri="{FF2B5EF4-FFF2-40B4-BE49-F238E27FC236}">
-                <a16:creationId xmlns:a16="http://schemas.microsoft.com/office/drawing/2014/main" id="{245ED7F0-AA08-4E3A-8032-A5C24E38EC33}"/>
-              </a:ext>
-            </a:extLst>
-          </p:cNvPr>
-          <p:cNvSpPr>
-            <a:spLocks noGrp="1"/>
-          </p:cNvSpPr>
-          <p:nvPr>
-            <p:ph type="ctrTitle"/>
-          </p:nvPr>
-        </p:nvSpPr>
-        <p:spPr>
-          <a:xfrm>
-            <a:off x="2256639" y="1860259"/>
-            <a:ext cx="6149130" cy="2026778"/>
-          </a:xfrm>
-        </p:spPr>
-        <p:txBody>
-          <a:bodyPr/>
-          <a:lstStyle/>
-          <a:p>
-            <a:r>
-              <a:rPr lang="en-US" sz="8800" dirty="0"/>
-              <a:t>PROJECT 1</a:t>
-            </a:r>
-            <a:br>
-              <a:rPr lang="en-US" sz="9600" dirty="0"/>
-            </a:br>
-            <a:endParaRPr lang="en-US" sz="3200" dirty="0"/>
-          </a:p>
-        </p:txBody>
-      </p:sp>
-    </p:spTree>
-    <p:extLst>
-      <p:ext uri="{BB962C8B-B14F-4D97-AF65-F5344CB8AC3E}">
-        <p14:creationId xmlns:p14="http://schemas.microsoft.com/office/powerpoint/2010/main" val="1636340252"/>
       </p:ext>
     </p:extLst>
   </p:cSld>

</xml_diff>